<commit_message>
plot/panel brackground colour white, mutate .by instead group_by
</commit_message>
<xml_diff>
--- a/Google Mobility.pptx
+++ b/Google Mobility.pptx
@@ -262,7 +262,7 @@
           <a:p>
             <a:fld id="{5961B664-884F-4468-AC05-53A1F6E6DF00}" type="datetimeFigureOut">
               <a:rPr lang="pt-BR" smtClean="0"/>
-              <a:t>13/01/2024</a:t>
+              <a:t>15/01/2024</a:t>
             </a:fld>
             <a:endParaRPr lang="pt-BR"/>
           </a:p>
@@ -460,7 +460,7 @@
           <a:p>
             <a:fld id="{5961B664-884F-4468-AC05-53A1F6E6DF00}" type="datetimeFigureOut">
               <a:rPr lang="pt-BR" smtClean="0"/>
-              <a:t>13/01/2024</a:t>
+              <a:t>15/01/2024</a:t>
             </a:fld>
             <a:endParaRPr lang="pt-BR"/>
           </a:p>
@@ -668,7 +668,7 @@
           <a:p>
             <a:fld id="{5961B664-884F-4468-AC05-53A1F6E6DF00}" type="datetimeFigureOut">
               <a:rPr lang="pt-BR" smtClean="0"/>
-              <a:t>13/01/2024</a:t>
+              <a:t>15/01/2024</a:t>
             </a:fld>
             <a:endParaRPr lang="pt-BR"/>
           </a:p>
@@ -866,7 +866,7 @@
           <a:p>
             <a:fld id="{5961B664-884F-4468-AC05-53A1F6E6DF00}" type="datetimeFigureOut">
               <a:rPr lang="pt-BR" smtClean="0"/>
-              <a:t>13/01/2024</a:t>
+              <a:t>15/01/2024</a:t>
             </a:fld>
             <a:endParaRPr lang="pt-BR"/>
           </a:p>
@@ -1141,7 +1141,7 @@
           <a:p>
             <a:fld id="{5961B664-884F-4468-AC05-53A1F6E6DF00}" type="datetimeFigureOut">
               <a:rPr lang="pt-BR" smtClean="0"/>
-              <a:t>13/01/2024</a:t>
+              <a:t>15/01/2024</a:t>
             </a:fld>
             <a:endParaRPr lang="pt-BR"/>
           </a:p>
@@ -1406,7 +1406,7 @@
           <a:p>
             <a:fld id="{5961B664-884F-4468-AC05-53A1F6E6DF00}" type="datetimeFigureOut">
               <a:rPr lang="pt-BR" smtClean="0"/>
-              <a:t>13/01/2024</a:t>
+              <a:t>15/01/2024</a:t>
             </a:fld>
             <a:endParaRPr lang="pt-BR"/>
           </a:p>
@@ -1818,7 +1818,7 @@
           <a:p>
             <a:fld id="{5961B664-884F-4468-AC05-53A1F6E6DF00}" type="datetimeFigureOut">
               <a:rPr lang="pt-BR" smtClean="0"/>
-              <a:t>13/01/2024</a:t>
+              <a:t>15/01/2024</a:t>
             </a:fld>
             <a:endParaRPr lang="pt-BR"/>
           </a:p>
@@ -1959,7 +1959,7 @@
           <a:p>
             <a:fld id="{5961B664-884F-4468-AC05-53A1F6E6DF00}" type="datetimeFigureOut">
               <a:rPr lang="pt-BR" smtClean="0"/>
-              <a:t>13/01/2024</a:t>
+              <a:t>15/01/2024</a:t>
             </a:fld>
             <a:endParaRPr lang="pt-BR"/>
           </a:p>
@@ -2072,7 +2072,7 @@
           <a:p>
             <a:fld id="{5961B664-884F-4468-AC05-53A1F6E6DF00}" type="datetimeFigureOut">
               <a:rPr lang="pt-BR" smtClean="0"/>
-              <a:t>13/01/2024</a:t>
+              <a:t>15/01/2024</a:t>
             </a:fld>
             <a:endParaRPr lang="pt-BR"/>
           </a:p>
@@ -2383,7 +2383,7 @@
           <a:p>
             <a:fld id="{5961B664-884F-4468-AC05-53A1F6E6DF00}" type="datetimeFigureOut">
               <a:rPr lang="pt-BR" smtClean="0"/>
-              <a:t>13/01/2024</a:t>
+              <a:t>15/01/2024</a:t>
             </a:fld>
             <a:endParaRPr lang="pt-BR"/>
           </a:p>
@@ -2671,7 +2671,7 @@
           <a:p>
             <a:fld id="{5961B664-884F-4468-AC05-53A1F6E6DF00}" type="datetimeFigureOut">
               <a:rPr lang="pt-BR" smtClean="0"/>
-              <a:t>13/01/2024</a:t>
+              <a:t>15/01/2024</a:t>
             </a:fld>
             <a:endParaRPr lang="pt-BR"/>
           </a:p>
@@ -2912,7 +2912,7 @@
           <a:p>
             <a:fld id="{5961B664-884F-4468-AC05-53A1F6E6DF00}" type="datetimeFigureOut">
               <a:rPr lang="pt-BR" smtClean="0"/>
-              <a:t>13/01/2024</a:t>
+              <a:t>15/01/2024</a:t>
             </a:fld>
             <a:endParaRPr lang="pt-BR"/>
           </a:p>
@@ -3481,14 +3481,13 @@
               </a:ext>
             </a:extLst>
           </a:blip>
-          <a:stretch>
-            <a:fillRect/>
-          </a:stretch>
+          <a:srcRect/>
+          <a:stretch/>
         </p:blipFill>
         <p:spPr>
           <a:xfrm>
             <a:off x="609589" y="228593"/>
-            <a:ext cx="10972822" cy="6400813"/>
+            <a:ext cx="10972822" cy="6400812"/>
           </a:xfrm>
           <a:prstGeom prst="rect">
             <a:avLst/>

</xml_diff>

<commit_message>
updating encoding to utf-8 and read function to read_csv
</commit_message>
<xml_diff>
--- a/Google Mobility.pptx
+++ b/Google Mobility.pptx
@@ -262,7 +262,7 @@
           <a:p>
             <a:fld id="{5961B664-884F-4468-AC05-53A1F6E6DF00}" type="datetimeFigureOut">
               <a:rPr lang="pt-BR" smtClean="0"/>
-              <a:t>15/01/2024</a:t>
+              <a:t>23/01/2024</a:t>
             </a:fld>
             <a:endParaRPr lang="pt-BR"/>
           </a:p>
@@ -460,7 +460,7 @@
           <a:p>
             <a:fld id="{5961B664-884F-4468-AC05-53A1F6E6DF00}" type="datetimeFigureOut">
               <a:rPr lang="pt-BR" smtClean="0"/>
-              <a:t>15/01/2024</a:t>
+              <a:t>23/01/2024</a:t>
             </a:fld>
             <a:endParaRPr lang="pt-BR"/>
           </a:p>
@@ -668,7 +668,7 @@
           <a:p>
             <a:fld id="{5961B664-884F-4468-AC05-53A1F6E6DF00}" type="datetimeFigureOut">
               <a:rPr lang="pt-BR" smtClean="0"/>
-              <a:t>15/01/2024</a:t>
+              <a:t>23/01/2024</a:t>
             </a:fld>
             <a:endParaRPr lang="pt-BR"/>
           </a:p>
@@ -866,7 +866,7 @@
           <a:p>
             <a:fld id="{5961B664-884F-4468-AC05-53A1F6E6DF00}" type="datetimeFigureOut">
               <a:rPr lang="pt-BR" smtClean="0"/>
-              <a:t>15/01/2024</a:t>
+              <a:t>23/01/2024</a:t>
             </a:fld>
             <a:endParaRPr lang="pt-BR"/>
           </a:p>
@@ -1141,7 +1141,7 @@
           <a:p>
             <a:fld id="{5961B664-884F-4468-AC05-53A1F6E6DF00}" type="datetimeFigureOut">
               <a:rPr lang="pt-BR" smtClean="0"/>
-              <a:t>15/01/2024</a:t>
+              <a:t>23/01/2024</a:t>
             </a:fld>
             <a:endParaRPr lang="pt-BR"/>
           </a:p>
@@ -1406,7 +1406,7 @@
           <a:p>
             <a:fld id="{5961B664-884F-4468-AC05-53A1F6E6DF00}" type="datetimeFigureOut">
               <a:rPr lang="pt-BR" smtClean="0"/>
-              <a:t>15/01/2024</a:t>
+              <a:t>23/01/2024</a:t>
             </a:fld>
             <a:endParaRPr lang="pt-BR"/>
           </a:p>
@@ -1818,7 +1818,7 @@
           <a:p>
             <a:fld id="{5961B664-884F-4468-AC05-53A1F6E6DF00}" type="datetimeFigureOut">
               <a:rPr lang="pt-BR" smtClean="0"/>
-              <a:t>15/01/2024</a:t>
+              <a:t>23/01/2024</a:t>
             </a:fld>
             <a:endParaRPr lang="pt-BR"/>
           </a:p>
@@ -1959,7 +1959,7 @@
           <a:p>
             <a:fld id="{5961B664-884F-4468-AC05-53A1F6E6DF00}" type="datetimeFigureOut">
               <a:rPr lang="pt-BR" smtClean="0"/>
-              <a:t>15/01/2024</a:t>
+              <a:t>23/01/2024</a:t>
             </a:fld>
             <a:endParaRPr lang="pt-BR"/>
           </a:p>
@@ -2072,7 +2072,7 @@
           <a:p>
             <a:fld id="{5961B664-884F-4468-AC05-53A1F6E6DF00}" type="datetimeFigureOut">
               <a:rPr lang="pt-BR" smtClean="0"/>
-              <a:t>15/01/2024</a:t>
+              <a:t>23/01/2024</a:t>
             </a:fld>
             <a:endParaRPr lang="pt-BR"/>
           </a:p>
@@ -2383,7 +2383,7 @@
           <a:p>
             <a:fld id="{5961B664-884F-4468-AC05-53A1F6E6DF00}" type="datetimeFigureOut">
               <a:rPr lang="pt-BR" smtClean="0"/>
-              <a:t>15/01/2024</a:t>
+              <a:t>23/01/2024</a:t>
             </a:fld>
             <a:endParaRPr lang="pt-BR"/>
           </a:p>
@@ -2671,7 +2671,7 @@
           <a:p>
             <a:fld id="{5961B664-884F-4468-AC05-53A1F6E6DF00}" type="datetimeFigureOut">
               <a:rPr lang="pt-BR" smtClean="0"/>
-              <a:t>15/01/2024</a:t>
+              <a:t>23/01/2024</a:t>
             </a:fld>
             <a:endParaRPr lang="pt-BR"/>
           </a:p>
@@ -2912,7 +2912,7 @@
           <a:p>
             <a:fld id="{5961B664-884F-4468-AC05-53A1F6E6DF00}" type="datetimeFigureOut">
               <a:rPr lang="pt-BR" smtClean="0"/>
-              <a:t>15/01/2024</a:t>
+              <a:t>23/01/2024</a:t>
             </a:fld>
             <a:endParaRPr lang="pt-BR"/>
           </a:p>
@@ -3331,7 +3331,7 @@
       </p:grpSpPr>
       <p:pic>
         <p:nvPicPr>
-          <p:cNvPr id="5" name="Imagem 4">
+          <p:cNvPr id="2" name="Imagem 4">
             <a:extLst>
               <a:ext uri="{FF2B5EF4-FFF2-40B4-BE49-F238E27FC236}">
                 <a16:creationId xmlns:a16="http://schemas.microsoft.com/office/drawing/2014/main" id="{758726AB-8B89-D4E8-FAF4-7D70F9CE13BB}"/>
@@ -3396,7 +3396,7 @@
       </p:grpSpPr>
       <p:pic>
         <p:nvPicPr>
-          <p:cNvPr id="5" name="Imagem 4">
+          <p:cNvPr id="2" name="Imagem 4">
             <a:extLst>
               <a:ext uri="{FF2B5EF4-FFF2-40B4-BE49-F238E27FC236}">
                 <a16:creationId xmlns:a16="http://schemas.microsoft.com/office/drawing/2014/main" id="{758726AB-8B89-D4E8-FAF4-7D70F9CE13BB}"/>
@@ -3461,7 +3461,7 @@
       </p:grpSpPr>
       <p:pic>
         <p:nvPicPr>
-          <p:cNvPr id="7" name="Imagem 6">
+          <p:cNvPr id="2" name="Imagem 6">
             <a:extLst>
               <a:ext uri="{FF2B5EF4-FFF2-40B4-BE49-F238E27FC236}">
                 <a16:creationId xmlns:a16="http://schemas.microsoft.com/office/drawing/2014/main" id="{0EB11E75-A980-CD63-8187-BE999C608BA3}"/>
@@ -3526,7 +3526,7 @@
       </p:grpSpPr>
       <p:pic>
         <p:nvPicPr>
-          <p:cNvPr id="5" name="Imagem 4">
+          <p:cNvPr id="2" name="Imagem 4">
             <a:extLst>
               <a:ext uri="{FF2B5EF4-FFF2-40B4-BE49-F238E27FC236}">
                 <a16:creationId xmlns:a16="http://schemas.microsoft.com/office/drawing/2014/main" id="{758726AB-8B89-D4E8-FAF4-7D70F9CE13BB}"/>

</xml_diff>